<commit_message>
Mise à jour de la présentation + fermeture de la fenêtre de connexion, après que cette dernière ait été effectuée correctement + scroll auto de l'arborescence des messages.
</commit_message>
<xml_diff>
--- a/Documentation/Projet de semestre.pptx
+++ b/Documentation/Projet de semestre.pptx
@@ -1566,8 +1566,8 @@
         </p:nvSpPr>
         <p:spPr>
           <a:xfrm>
-            <a:off x="574672" y="812801"/>
-            <a:ext cx="6405564" cy="4005264"/>
+            <a:off x="574675" y="812800"/>
+            <a:ext cx="6405563" cy="4005263"/>
           </a:xfrm>
           <a:solidFill>
             <a:srgbClr val="729FCF"/>
@@ -1926,8 +1926,8 @@
         </p:nvSpPr>
         <p:spPr>
           <a:xfrm>
-            <a:off x="574672" y="812801"/>
-            <a:ext cx="6405564" cy="4005264"/>
+            <a:off x="574675" y="812800"/>
+            <a:ext cx="6405563" cy="4005263"/>
           </a:xfrm>
           <a:solidFill>
             <a:srgbClr val="729FCF"/>
@@ -1998,8 +1998,8 @@
         </p:nvSpPr>
         <p:spPr>
           <a:xfrm>
-            <a:off x="574672" y="812801"/>
-            <a:ext cx="6405564" cy="4005264"/>
+            <a:off x="574675" y="812800"/>
+            <a:ext cx="6405563" cy="4005263"/>
           </a:xfrm>
           <a:solidFill>
             <a:srgbClr val="729FCF"/>
@@ -5706,7 +5706,7 @@
               </a:defRPr>
             </a:pPr>
             <a:r>
-              <a:rPr lang="fr-CH" sz="3700" b="0" i="0" u="none" strike="noStrike" kern="0" cap="none" spc="0" baseline="0">
+              <a:rPr lang="fr-CH" sz="3700" b="0" i="0" u="none" strike="noStrike" kern="0" cap="none" spc="0" baseline="0" dirty="0" smtClean="0">
                 <a:solidFill>
                   <a:srgbClr val="000000"/>
                 </a:solidFill>
@@ -5715,8 +5715,17 @@
                 <a:ea typeface="Arial Unicode MS" pitchFamily="2"/>
                 <a:cs typeface="Arial Unicode MS" pitchFamily="2"/>
               </a:rPr>
-              <a:t>Points positifs</a:t>
-            </a:r>
+              <a:t>Aspects positifs</a:t>
+            </a:r>
+            <a:endParaRPr lang="fr-CH" sz="3700" b="0" i="0" u="none" strike="noStrike" kern="0" cap="none" spc="0" baseline="0" dirty="0">
+              <a:solidFill>
+                <a:srgbClr val="000000"/>
+              </a:solidFill>
+              <a:uFillTx/>
+              <a:latin typeface="Arial" pitchFamily="18"/>
+              <a:ea typeface="Arial Unicode MS" pitchFamily="2"/>
+              <a:cs typeface="Arial Unicode MS" pitchFamily="2"/>
+            </a:endParaRPr>
           </a:p>
         </p:txBody>
       </p:sp>
@@ -5816,7 +5825,7 @@
                 <a:uFillTx/>
               </a:defRPr>
             </a:pPr>
-            <a:endParaRPr lang="fr-FR" sz="2800" b="0" i="0" u="none" strike="noStrike" kern="0" cap="none" spc="0" baseline="0">
+            <a:endParaRPr lang="fr-FR" sz="2800" b="0" i="0" u="none" strike="noStrike" kern="0" cap="none" spc="0" baseline="0" dirty="0">
               <a:solidFill>
                 <a:srgbClr val="000000"/>
               </a:solidFill>
@@ -5874,7 +5883,7 @@
               </a:defRPr>
             </a:pPr>
             <a:r>
-              <a:rPr lang="fr-FR" sz="2800" b="0" i="0" u="none" strike="noStrike" kern="0" cap="none" spc="0" baseline="0">
+              <a:rPr lang="fr-FR" sz="2800" b="0" i="0" u="none" strike="noStrike" kern="0" cap="none" spc="0" baseline="0" dirty="0">
                 <a:solidFill>
                   <a:srgbClr val="000000"/>
                 </a:solidFill>
@@ -5934,7 +5943,7 @@
               </a:defRPr>
             </a:pPr>
             <a:r>
-              <a:rPr lang="fr-FR" sz="2800" b="0" i="0" u="none" strike="noStrike" kern="0" cap="none" spc="0" baseline="0">
+              <a:rPr lang="fr-FR" sz="2800" b="0" i="0" u="none" strike="noStrike" kern="0" cap="none" spc="0" baseline="0" dirty="0">
                 <a:solidFill>
                   <a:srgbClr val="000000"/>
                 </a:solidFill>
@@ -5994,7 +6003,7 @@
               </a:defRPr>
             </a:pPr>
             <a:r>
-              <a:rPr lang="fr-FR" sz="2800" b="0" i="0" u="none" strike="noStrike" kern="0" cap="none" spc="0" baseline="0">
+              <a:rPr lang="fr-FR" sz="2800" b="0" i="0" u="none" strike="noStrike" kern="0" cap="none" spc="0" baseline="0" dirty="0">
                 <a:solidFill>
                   <a:srgbClr val="000000"/>
                 </a:solidFill>
@@ -6003,7 +6012,55 @@
                 <a:ea typeface="Arial Unicode MS" pitchFamily="2"/>
                 <a:cs typeface="Arial Unicode MS" pitchFamily="2"/>
               </a:rPr>
-              <a:t> Apprentissage de Qt, perfectionnement en C++.</a:t>
+              <a:t> Apprentissage de </a:t>
+            </a:r>
+            <a:r>
+              <a:rPr lang="fr-FR" sz="2800" b="0" i="0" u="none" strike="noStrike" kern="0" cap="none" spc="0" baseline="0" dirty="0" err="1">
+                <a:solidFill>
+                  <a:srgbClr val="000000"/>
+                </a:solidFill>
+                <a:uFillTx/>
+                <a:latin typeface="Calibri" pitchFamily="2"/>
+                <a:ea typeface="Arial Unicode MS" pitchFamily="2"/>
+                <a:cs typeface="Arial Unicode MS" pitchFamily="2"/>
+              </a:rPr>
+              <a:t>Qt</a:t>
+            </a:r>
+            <a:r>
+              <a:rPr lang="fr-FR" sz="2800" b="0" i="0" u="none" strike="noStrike" kern="0" cap="none" spc="0" baseline="0" dirty="0">
+                <a:solidFill>
+                  <a:srgbClr val="000000"/>
+                </a:solidFill>
+                <a:uFillTx/>
+                <a:latin typeface="Calibri" pitchFamily="2"/>
+                <a:ea typeface="Arial Unicode MS" pitchFamily="2"/>
+                <a:cs typeface="Arial Unicode MS" pitchFamily="2"/>
+              </a:rPr>
+              <a:t>, perfectionnement </a:t>
+            </a:r>
+            <a:r>
+              <a:rPr lang="fr-FR" sz="2800" b="0" i="0" u="none" strike="noStrike" kern="0" cap="none" spc="0" baseline="0" dirty="0" smtClean="0">
+                <a:solidFill>
+                  <a:srgbClr val="000000"/>
+                </a:solidFill>
+                <a:uFillTx/>
+                <a:latin typeface="Calibri" pitchFamily="2"/>
+                <a:ea typeface="Arial Unicode MS" pitchFamily="2"/>
+                <a:cs typeface="Arial Unicode MS" pitchFamily="2"/>
+              </a:rPr>
+              <a:t>du </a:t>
+            </a:r>
+            <a:r>
+              <a:rPr lang="fr-FR" sz="2800" b="0" i="0" u="none" strike="noStrike" kern="0" cap="none" spc="0" baseline="0" dirty="0">
+                <a:solidFill>
+                  <a:srgbClr val="000000"/>
+                </a:solidFill>
+                <a:uFillTx/>
+                <a:latin typeface="Calibri" pitchFamily="2"/>
+                <a:ea typeface="Arial Unicode MS" pitchFamily="2"/>
+                <a:cs typeface="Arial Unicode MS" pitchFamily="2"/>
+              </a:rPr>
+              <a:t>C++.</a:t>
             </a:r>
           </a:p>
           <a:p>
@@ -6054,7 +6111,7 @@
               </a:defRPr>
             </a:pPr>
             <a:r>
-              <a:rPr lang="fr-FR" sz="2800" b="0" i="0" u="none" strike="noStrike" kern="0" cap="none" spc="0" baseline="0">
+              <a:rPr lang="fr-FR" sz="2800" b="0" i="0" u="none" strike="noStrike" kern="0" cap="none" spc="0" baseline="0" dirty="0">
                 <a:solidFill>
                   <a:srgbClr val="000000"/>
                 </a:solidFill>
@@ -6159,12 +6216,16 @@
   <p:clrMapOvr>
     <a:masterClrMapping/>
   </p:clrMapOvr>
-  <mc:AlternateContent xmlns:mc="http://schemas.openxmlformats.org/markup-compatibility/2006" xmlns:p14="http://schemas.microsoft.com/office/powerpoint/2010/main">
-    <mc:Choice Requires="p14">
-      <p:transition spd="slow" p14:dur="2000"/>
+  <mc:AlternateContent xmlns:mc="http://schemas.openxmlformats.org/markup-compatibility/2006">
+    <mc:Choice xmlns:p14="http://schemas.microsoft.com/office/powerpoint/2010/main" Requires="p14">
+      <p:transition spd="med" p14:dur="700">
+        <p:fade/>
+      </p:transition>
     </mc:Choice>
-    <mc:Fallback xmlns="">
-      <p:transition spd="slow"/>
+    <mc:Fallback>
+      <p:transition spd="med">
+        <p:fade/>
+      </p:transition>
     </mc:Fallback>
   </mc:AlternateContent>
   <p:timing>
@@ -6238,7 +6299,7 @@
           <a:lstStyle/>
           <a:p>
             <a:pPr lvl="0"/>
-            <a:endParaRPr lang="fr-FR"/>
+            <a:endParaRPr lang="fr-FR" dirty="0"/>
           </a:p>
           <a:p>
             <a:pPr lvl="0">
@@ -6250,7 +6311,7 @@
               <a:buChar char="●"/>
             </a:pPr>
             <a:r>
-              <a:rPr lang="fr-FR"/>
+              <a:rPr lang="fr-FR" dirty="0"/>
               <a:t> La planification a été plutôt bien respectée pour le moment.</a:t>
             </a:r>
           </a:p>
@@ -6264,8 +6325,16 @@
               <a:buChar char="●"/>
             </a:pPr>
             <a:r>
-              <a:rPr lang="fr-FR"/>
-              <a:t> Les fonctionnalités de bases sont (presque) implémentées.</a:t>
+              <a:rPr lang="fr-FR" dirty="0"/>
+              <a:t> Les fonctionnalités de bases sont (</a:t>
+            </a:r>
+            <a:r>
+              <a:rPr lang="fr-FR" dirty="0" smtClean="0"/>
+              <a:t>presque) </a:t>
+            </a:r>
+            <a:r>
+              <a:rPr lang="fr-FR" dirty="0"/>
+              <a:t>implémentées.</a:t>
             </a:r>
           </a:p>
           <a:p>
@@ -6278,7 +6347,7 @@
               <a:buChar char="●"/>
             </a:pPr>
             <a:r>
-              <a:rPr lang="fr-FR"/>
+              <a:rPr lang="fr-FR" dirty="0"/>
               <a:t> Globalement pas ou peu de retard.</a:t>
             </a:r>
           </a:p>
@@ -6292,7 +6361,7 @@
               <a:buChar char="●"/>
             </a:pPr>
             <a:r>
-              <a:rPr lang="fr-FR"/>
+              <a:rPr lang="fr-FR" dirty="0"/>
               <a:t> Quelques problèmes rencontrés mais rien d'insurmontable.</a:t>
             </a:r>
           </a:p>
@@ -6302,12 +6371,29 @@
                 <a:srgbClr val="000000"/>
               </a:buClr>
               <a:buSzPct val="45000"/>
-              <a:buFont typeface="StarSymbol"/>
-              <a:buChar char="●"/>
             </a:pPr>
             <a:r>
-              <a:rPr lang="fr-FR"/>
-              <a:t> Impressions personnelles…</a:t>
+              <a:rPr lang="fr-FR" dirty="0"/>
+              <a:t> </a:t>
+            </a:r>
+            <a:endParaRPr lang="fr-FR" dirty="0" smtClean="0"/>
+          </a:p>
+          <a:p>
+            <a:pPr marL="799917" lvl="0" indent="-457200">
+              <a:buClr>
+                <a:srgbClr val="000000"/>
+              </a:buClr>
+              <a:buSzPct val="45000"/>
+              <a:buFont typeface="Wingdings" panose="05000000000000000000" pitchFamily="2" charset="2"/>
+              <a:buChar char="Ø"/>
+            </a:pPr>
+            <a:r>
+              <a:rPr lang="fr-FR" dirty="0" smtClean="0"/>
+              <a:t>Impressions </a:t>
+            </a:r>
+            <a:r>
+              <a:rPr lang="fr-FR" dirty="0"/>
+              <a:t>personnelles…</a:t>
             </a:r>
           </a:p>
         </p:txBody>
@@ -6907,7 +6993,12 @@
             <p:ph type="title" idx="4294967295"/>
           </p:nvPr>
         </p:nvSpPr>
-        <p:spPr/>
+        <p:spPr>
+          <a:xfrm>
+            <a:off x="503276" y="489032"/>
+            <a:ext cx="9067684" cy="572464"/>
+          </a:xfrm>
+        </p:spPr>
         <p:txBody>
           <a:bodyPr>
             <a:spAutoFit/>
@@ -6916,9 +7007,18 @@
           <a:p>
             <a:pPr lvl="0"/>
             <a:r>
-              <a:rPr lang="fr-CH" sz="4000"/>
-              <a:t>Chator en Bref</a:t>
-            </a:r>
+              <a:rPr lang="fr-CH" sz="4000" dirty="0" err="1"/>
+              <a:t>Chator</a:t>
+            </a:r>
+            <a:r>
+              <a:rPr lang="fr-CH" sz="4000" dirty="0"/>
+              <a:t> en </a:t>
+            </a:r>
+            <a:r>
+              <a:rPr lang="fr-CH" sz="4000" dirty="0" smtClean="0"/>
+              <a:t>bref</a:t>
+            </a:r>
+            <a:endParaRPr lang="fr-CH" sz="4000" dirty="0"/>
           </a:p>
         </p:txBody>
       </p:sp>
@@ -6950,40 +7050,40 @@
               <a:buFont typeface="StarSymbol"/>
               <a:buChar char="●"/>
             </a:pPr>
-            <a:endParaRPr lang="fr-CH"/>
+            <a:endParaRPr lang="fr-CH" dirty="0"/>
           </a:p>
           <a:p>
             <a:pPr lvl="0" algn="ctr"/>
             <a:r>
-              <a:rPr lang="fr-FR"/>
+              <a:rPr lang="fr-FR" dirty="0"/>
               <a:t> Application de chat centralisée</a:t>
             </a:r>
           </a:p>
           <a:p>
             <a:pPr lvl="0" algn="ctr"/>
             <a:r>
-              <a:rPr lang="fr-FR"/>
+              <a:rPr lang="fr-FR" dirty="0"/>
               <a:t> Salles de discussion</a:t>
             </a:r>
           </a:p>
           <a:p>
             <a:pPr lvl="0" algn="ctr"/>
             <a:r>
-              <a:rPr lang="fr-FR"/>
+              <a:rPr lang="fr-FR" dirty="0"/>
               <a:t> Salle privée ou publique</a:t>
             </a:r>
           </a:p>
           <a:p>
             <a:pPr lvl="0" algn="ctr"/>
             <a:r>
-              <a:rPr lang="fr-FR"/>
+              <a:rPr lang="fr-FR" dirty="0"/>
               <a:t> Échange de messages sécurisé</a:t>
             </a:r>
           </a:p>
           <a:p>
             <a:pPr lvl="0" algn="ctr"/>
             <a:r>
-              <a:rPr lang="fr-FR"/>
+              <a:rPr lang="fr-FR" dirty="0"/>
               <a:t> Stockage de messages sécurisé</a:t>
             </a:r>
           </a:p>
@@ -7375,15 +7475,15 @@
           <a:p>
             <a:pPr lvl="0"/>
             <a:r>
-              <a:rPr lang="fr-CH" sz="4000"/>
+              <a:rPr lang="fr-CH" sz="4000" dirty="0"/>
               <a:t>Planification</a:t>
             </a:r>
             <a:r>
-              <a:rPr lang="fr-CH" sz="4800"/>
+              <a:rPr lang="fr-CH" sz="4800" dirty="0"/>
               <a:t> </a:t>
             </a:r>
             <a:r>
-              <a:rPr lang="fr-CH" sz="4000"/>
+              <a:rPr lang="fr-CH" sz="4000" dirty="0"/>
               <a:t>Initiale</a:t>
             </a:r>
           </a:p>
@@ -7618,7 +7718,7 @@
           <a:p>
             <a:pPr lvl="0"/>
             <a:r>
-              <a:rPr lang="fr-CH" sz="4000"/>
+              <a:rPr lang="fr-CH" sz="4000" dirty="0"/>
               <a:t>Planification Actuelle</a:t>
             </a:r>
           </a:p>
@@ -8871,12 +8971,16 @@
   <p:clrMapOvr>
     <a:masterClrMapping/>
   </p:clrMapOvr>
-  <mc:AlternateContent xmlns:mc="http://schemas.openxmlformats.org/markup-compatibility/2006" xmlns:p14="http://schemas.microsoft.com/office/powerpoint/2010/main">
-    <mc:Choice Requires="p14">
-      <p:transition spd="slow" p14:dur="2000"/>
+  <mc:AlternateContent xmlns:mc="http://schemas.openxmlformats.org/markup-compatibility/2006">
+    <mc:Choice xmlns:p14="http://schemas.microsoft.com/office/powerpoint/2010/main" Requires="p14">
+      <p:transition spd="med" p14:dur="700">
+        <p:fade/>
+      </p:transition>
     </mc:Choice>
-    <mc:Fallback xmlns="">
-      <p:transition spd="slow"/>
+    <mc:Fallback>
+      <p:transition spd="med">
+        <p:fade/>
+      </p:transition>
     </mc:Fallback>
   </mc:AlternateContent>
   <p:timing>
@@ -9035,7 +9139,7 @@
               <a:buChar char="●"/>
             </a:pPr>
             <a:r>
-              <a:rPr lang="fr-FR" sz="2000"/>
+              <a:rPr lang="fr-FR" sz="2000" dirty="0"/>
               <a:t> Établissement de la communication entre le serveur et le client.</a:t>
             </a:r>
           </a:p>
@@ -9049,9 +9153,32 @@
               <a:buChar char="●"/>
             </a:pPr>
             <a:r>
-              <a:rPr lang="fr-FR" sz="2000"/>
-              <a:t> Installation de bibliothèques tierces sur Windows (SSL).</a:t>
-            </a:r>
+              <a:rPr lang="fr-FR" sz="2000" dirty="0"/>
+              <a:t> Installation de bibliothèques tierces sur Windows (SSL</a:t>
+            </a:r>
+            <a:r>
+              <a:rPr lang="fr-FR" sz="2000" dirty="0" smtClean="0"/>
+              <a:t>).</a:t>
+            </a:r>
+          </a:p>
+          <a:p>
+            <a:pPr lvl="0">
+              <a:buClr>
+                <a:srgbClr val="000000"/>
+              </a:buClr>
+              <a:buSzPct val="45000"/>
+              <a:buFont typeface="StarSymbol"/>
+              <a:buChar char="●"/>
+            </a:pPr>
+            <a:r>
+              <a:rPr lang="fr-FR" sz="2000" dirty="0"/>
+              <a:t> </a:t>
+            </a:r>
+            <a:r>
+              <a:rPr lang="fr-FR" sz="2000" dirty="0" smtClean="0"/>
+              <a:t>Dépendances circulaires.</a:t>
+            </a:r>
+            <a:endParaRPr lang="fr-FR" sz="2000" dirty="0"/>
           </a:p>
         </p:txBody>
       </p:sp>

</xml_diff>

<commit_message>
Gestion des notification + liaison avec le module Room.
</commit_message>
<xml_diff>
--- a/Documentation/Projet de semestre.pptx
+++ b/Documentation/Projet de semestre.pptx
@@ -5,24 +5,25 @@
     <p:sldMasterId id="2147483648" r:id="rId1"/>
   </p:sldMasterIdLst>
   <p:notesMasterIdLst>
-    <p:notesMasterId r:id="rId14"/>
+    <p:notesMasterId r:id="rId15"/>
   </p:notesMasterIdLst>
   <p:handoutMasterIdLst>
-    <p:handoutMasterId r:id="rId15"/>
+    <p:handoutMasterId r:id="rId16"/>
   </p:handoutMasterIdLst>
   <p:sldIdLst>
     <p:sldId id="256" r:id="rId2"/>
     <p:sldId id="257" r:id="rId3"/>
     <p:sldId id="258" r:id="rId4"/>
     <p:sldId id="264" r:id="rId5"/>
-    <p:sldId id="259" r:id="rId6"/>
-    <p:sldId id="260" r:id="rId7"/>
-    <p:sldId id="261" r:id="rId8"/>
-    <p:sldId id="267" r:id="rId9"/>
-    <p:sldId id="262" r:id="rId10"/>
-    <p:sldId id="266" r:id="rId11"/>
-    <p:sldId id="263" r:id="rId12"/>
-    <p:sldId id="265" r:id="rId13"/>
+    <p:sldId id="268" r:id="rId6"/>
+    <p:sldId id="259" r:id="rId7"/>
+    <p:sldId id="260" r:id="rId8"/>
+    <p:sldId id="261" r:id="rId9"/>
+    <p:sldId id="267" r:id="rId10"/>
+    <p:sldId id="262" r:id="rId11"/>
+    <p:sldId id="266" r:id="rId12"/>
+    <p:sldId id="263" r:id="rId13"/>
+    <p:sldId id="265" r:id="rId14"/>
   </p:sldIdLst>
   <p:sldSz cx="10080625" cy="6300788"/>
   <p:notesSz cx="7559675" cy="10691813"/>
@@ -1422,8 +1423,80 @@
         </p:nvSpPr>
         <p:spPr>
           <a:xfrm>
-            <a:off x="574672" y="812801"/>
-            <a:ext cx="6405564" cy="4005264"/>
+            <a:off x="574675" y="812800"/>
+            <a:ext cx="6405563" cy="4005263"/>
+          </a:xfrm>
+          <a:solidFill>
+            <a:srgbClr val="729FCF"/>
+          </a:solidFill>
+          <a:ln w="25402">
+            <a:solidFill>
+              <a:srgbClr val="3465AF"/>
+            </a:solidFill>
+            <a:prstDash val="solid"/>
+          </a:ln>
+        </p:spPr>
+      </p:sp>
+      <p:sp>
+        <p:nvSpPr>
+          <p:cNvPr id="3" name="Espace réservé des commentaires 2"/>
+          <p:cNvSpPr txBox="1">
+            <a:spLocks noGrp="1"/>
+          </p:cNvSpPr>
+          <p:nvPr>
+            <p:ph type="body" sz="quarter" idx="1"/>
+          </p:nvPr>
+        </p:nvSpPr>
+        <p:spPr/>
+        <p:txBody>
+          <a:bodyPr>
+            <a:spAutoFit/>
+          </a:bodyPr>
+          <a:lstStyle/>
+          <a:p>
+            <a:endParaRPr lang="fr-CH"/>
+          </a:p>
+        </p:txBody>
+      </p:sp>
+    </p:spTree>
+  </p:cSld>
+  <p:clrMapOvr>
+    <a:masterClrMapping/>
+  </p:clrMapOvr>
+</p:notes>
+</file>
+
+<file path=ppt/notesSlides/notesSlide11.xml><?xml version="1.0" encoding="utf-8"?>
+<p:notes xmlns:a="http://schemas.openxmlformats.org/drawingml/2006/main" xmlns:r="http://schemas.openxmlformats.org/officeDocument/2006/relationships" xmlns:p="http://schemas.openxmlformats.org/presentationml/2006/main">
+  <p:cSld>
+    <p:spTree>
+      <p:nvGrpSpPr>
+        <p:cNvPr id="1" name=""/>
+        <p:cNvGrpSpPr/>
+        <p:nvPr/>
+      </p:nvGrpSpPr>
+      <p:grpSpPr>
+        <a:xfrm>
+          <a:off x="0" y="0"/>
+          <a:ext cx="0" cy="0"/>
+          <a:chOff x="0" y="0"/>
+          <a:chExt cx="0" cy="0"/>
+        </a:xfrm>
+      </p:grpSpPr>
+      <p:sp>
+        <p:nvSpPr>
+          <p:cNvPr id="2" name="Espace réservé de l'image des diapositives 1"/>
+          <p:cNvSpPr>
+            <a:spLocks noGrp="1" noRot="1" noChangeAspect="1"/>
+          </p:cNvSpPr>
+          <p:nvPr>
+            <p:ph type="sldImg"/>
+          </p:nvPr>
+        </p:nvSpPr>
+        <p:spPr>
+          <a:xfrm>
+            <a:off x="574675" y="812800"/>
+            <a:ext cx="6405563" cy="4005263"/>
           </a:xfrm>
           <a:solidFill>
             <a:srgbClr val="729FCF"/>
@@ -1638,8 +1711,8 @@
         </p:nvSpPr>
         <p:spPr>
           <a:xfrm>
-            <a:off x="574672" y="812801"/>
-            <a:ext cx="6405564" cy="4005264"/>
+            <a:off x="574675" y="812800"/>
+            <a:ext cx="6405563" cy="4005263"/>
           </a:xfrm>
           <a:solidFill>
             <a:srgbClr val="729FCF"/>
@@ -1854,8 +1927,8 @@
         </p:nvSpPr>
         <p:spPr>
           <a:xfrm>
-            <a:off x="574672" y="812801"/>
-            <a:ext cx="6405564" cy="4005264"/>
+            <a:off x="574675" y="812800"/>
+            <a:ext cx="6405563" cy="4005263"/>
           </a:xfrm>
           <a:solidFill>
             <a:srgbClr val="729FCF"/>
@@ -5470,7 +5543,7 @@
               </a:defRPr>
             </a:pPr>
             <a:r>
-              <a:rPr lang="fr-CH" sz="1400" b="0" i="0" u="none" strike="noStrike" kern="1200" cap="none" spc="0" baseline="0">
+              <a:rPr lang="fr-CH" sz="1400" b="0" i="0" u="none" strike="noStrike" kern="1200" cap="none" spc="0" baseline="0" dirty="0">
                 <a:solidFill>
                   <a:srgbClr val="000000"/>
                 </a:solidFill>
@@ -5501,7 +5574,7 @@
               </a:defRPr>
             </a:pPr>
             <a:r>
-              <a:rPr lang="fr-CH" sz="1400" b="0" i="0" u="none" strike="noStrike" kern="1200" cap="none" spc="0" baseline="0">
+              <a:rPr lang="fr-CH" sz="1400" b="0" i="0" u="none" strike="noStrike" kern="1200" cap="none" spc="0" baseline="0" dirty="0">
                 <a:solidFill>
                   <a:srgbClr val="000000"/>
                 </a:solidFill>
@@ -5532,7 +5605,7 @@
               </a:defRPr>
             </a:pPr>
             <a:r>
-              <a:rPr lang="fr-CH" sz="1400" b="0" i="0" u="none" strike="noStrike" kern="1200" cap="none" spc="0" baseline="0">
+              <a:rPr lang="fr-CH" sz="1400" b="0" i="0" u="none" strike="noStrike" kern="1200" cap="none" spc="0" baseline="0" dirty="0">
                 <a:solidFill>
                   <a:srgbClr val="000000"/>
                 </a:solidFill>
@@ -5563,7 +5636,7 @@
               </a:defRPr>
             </a:pPr>
             <a:r>
-              <a:rPr lang="fr-CH" sz="1400" b="0" i="0" u="none" strike="noStrike" kern="1200" cap="none" spc="0" baseline="0">
+              <a:rPr lang="fr-CH" sz="1400" b="0" i="0" u="none" strike="noStrike" kern="1200" cap="none" spc="0" baseline="0" dirty="0">
                 <a:solidFill>
                   <a:srgbClr val="000000"/>
                 </a:solidFill>
@@ -5594,7 +5667,7 @@
               </a:defRPr>
             </a:pPr>
             <a:r>
-              <a:rPr lang="fr-CH" sz="1400" b="0" i="0" u="none" strike="noStrike" kern="1200" cap="none" spc="0" baseline="0">
+              <a:rPr lang="fr-CH" sz="1400" b="0" i="0" u="none" strike="noStrike" kern="1200" cap="none" spc="0" baseline="0" dirty="0">
                 <a:solidFill>
                   <a:srgbClr val="000000"/>
                 </a:solidFill>
@@ -5603,6 +5676,36 @@
               </a:rPr>
               <a:t>Wolleb Benoist</a:t>
             </a:r>
+          </a:p>
+        </p:txBody>
+      </p:sp>
+      <p:sp>
+        <p:nvSpPr>
+          <p:cNvPr id="6" name="ZoneTexte 5"/>
+          <p:cNvSpPr txBox="1"/>
+          <p:nvPr/>
+        </p:nvSpPr>
+        <p:spPr>
+          <a:xfrm>
+            <a:off x="7344568" y="5886698"/>
+            <a:ext cx="2736304" cy="369332"/>
+          </a:xfrm>
+          <a:prstGeom prst="rect">
+            <a:avLst/>
+          </a:prstGeom>
+          <a:noFill/>
+        </p:spPr>
+        <p:txBody>
+          <a:bodyPr wrap="square" rtlCol="0">
+            <a:spAutoFit/>
+          </a:bodyPr>
+          <a:lstStyle/>
+          <a:p>
+            <a:r>
+              <a:rPr lang="fr-CH" dirty="0" smtClean="0"/>
+              <a:t>Présentation intermédiaire</a:t>
+            </a:r>
+            <a:endParaRPr lang="fr-CH" dirty="0"/>
           </a:p>
         </p:txBody>
       </p:sp>
@@ -5625,6 +5728,394 @@
 </file>
 
 <file path=ppt/slides/slide10.xml><?xml version="1.0" encoding="utf-8"?>
+<p:sld xmlns:a="http://schemas.openxmlformats.org/drawingml/2006/main" xmlns:r="http://schemas.openxmlformats.org/officeDocument/2006/relationships" xmlns:p="http://schemas.openxmlformats.org/presentationml/2006/main">
+  <p:cSld name="page7">
+    <p:spTree>
+      <p:nvGrpSpPr>
+        <p:cNvPr id="1" name=""/>
+        <p:cNvGrpSpPr/>
+        <p:nvPr/>
+      </p:nvGrpSpPr>
+      <p:grpSpPr>
+        <a:xfrm>
+          <a:off x="0" y="0"/>
+          <a:ext cx="0" cy="0"/>
+          <a:chOff x="0" y="0"/>
+          <a:chExt cx="0" cy="0"/>
+        </a:xfrm>
+      </p:grpSpPr>
+      <p:sp>
+        <p:nvSpPr>
+          <p:cNvPr id="2" name="Titre 1"/>
+          <p:cNvSpPr txBox="1">
+            <a:spLocks noGrp="1"/>
+          </p:cNvSpPr>
+          <p:nvPr>
+            <p:ph type="title" idx="4294967295"/>
+          </p:nvPr>
+        </p:nvSpPr>
+        <p:spPr/>
+        <p:txBody>
+          <a:bodyPr/>
+          <a:lstStyle/>
+          <a:p>
+            <a:pPr lvl="0"/>
+            <a:r>
+              <a:rPr lang="fr-CH"/>
+              <a:t>Problèmes Rencontrés</a:t>
+            </a:r>
+          </a:p>
+        </p:txBody>
+      </p:sp>
+      <p:sp>
+        <p:nvSpPr>
+          <p:cNvPr id="3" name="Espace réservé du texte 2"/>
+          <p:cNvSpPr txBox="1">
+            <a:spLocks noGrp="1"/>
+          </p:cNvSpPr>
+          <p:nvPr>
+            <p:ph type="body" idx="4294967295"/>
+          </p:nvPr>
+        </p:nvSpPr>
+        <p:spPr>
+          <a:xfrm>
+            <a:off x="647998" y="2214457"/>
+            <a:ext cx="9067684" cy="1511996"/>
+          </a:xfrm>
+        </p:spPr>
+        <p:txBody>
+          <a:bodyPr/>
+          <a:lstStyle/>
+          <a:p>
+            <a:pPr lvl="0">
+              <a:buClr>
+                <a:srgbClr val="000000"/>
+              </a:buClr>
+              <a:buSzPct val="45000"/>
+              <a:buFont typeface="StarSymbol"/>
+              <a:buChar char="●"/>
+            </a:pPr>
+            <a:r>
+              <a:rPr lang="fr-FR" sz="2000"/>
+              <a:t> Gestion et synchronisation des travaux de chaque personne.</a:t>
+            </a:r>
+          </a:p>
+          <a:p>
+            <a:pPr lvl="0">
+              <a:buClr>
+                <a:srgbClr val="000000"/>
+              </a:buClr>
+              <a:buSzPct val="45000"/>
+              <a:buFont typeface="StarSymbol"/>
+              <a:buChar char="●"/>
+            </a:pPr>
+            <a:r>
+              <a:rPr lang="fr-FR" sz="2000"/>
+              <a:t> Suivi des conventions de codage.</a:t>
+            </a:r>
+          </a:p>
+          <a:p>
+            <a:pPr lvl="0">
+              <a:buClr>
+                <a:srgbClr val="000000"/>
+              </a:buClr>
+              <a:buSzPct val="45000"/>
+              <a:buFont typeface="StarSymbol"/>
+              <a:buChar char="●"/>
+            </a:pPr>
+            <a:r>
+              <a:rPr lang="fr-FR" sz="2000"/>
+              <a:t> Application du modèle MVC.</a:t>
+            </a:r>
+          </a:p>
+          <a:p>
+            <a:pPr lvl="0">
+              <a:buClr>
+                <a:srgbClr val="000000"/>
+              </a:buClr>
+              <a:buSzPct val="45000"/>
+              <a:buFont typeface="StarSymbol"/>
+              <a:buChar char="●"/>
+            </a:pPr>
+            <a:r>
+              <a:rPr lang="fr-FR" sz="2000"/>
+              <a:t> Mises à niveaux et formations.</a:t>
+            </a:r>
+          </a:p>
+        </p:txBody>
+      </p:sp>
+      <p:sp>
+        <p:nvSpPr>
+          <p:cNvPr id="4" name="Espace réservé du texte 3"/>
+          <p:cNvSpPr txBox="1">
+            <a:spLocks noGrp="1"/>
+          </p:cNvSpPr>
+          <p:nvPr>
+            <p:ph type="body" idx="4294967295"/>
+          </p:nvPr>
+        </p:nvSpPr>
+        <p:spPr>
+          <a:xfrm>
+            <a:off x="647998" y="4806717"/>
+            <a:ext cx="9067684" cy="1223997"/>
+          </a:xfrm>
+        </p:spPr>
+        <p:txBody>
+          <a:bodyPr/>
+          <a:lstStyle/>
+          <a:p>
+            <a:pPr lvl="0">
+              <a:buClr>
+                <a:srgbClr val="000000"/>
+              </a:buClr>
+              <a:buSzPct val="45000"/>
+              <a:buFont typeface="StarSymbol"/>
+              <a:buChar char="●"/>
+            </a:pPr>
+            <a:r>
+              <a:rPr lang="fr-FR" sz="2000" dirty="0"/>
+              <a:t> Établissement de la communication entre le serveur et le client.</a:t>
+            </a:r>
+          </a:p>
+          <a:p>
+            <a:pPr lvl="0">
+              <a:buClr>
+                <a:srgbClr val="000000"/>
+              </a:buClr>
+              <a:buSzPct val="45000"/>
+              <a:buFont typeface="StarSymbol"/>
+              <a:buChar char="●"/>
+            </a:pPr>
+            <a:r>
+              <a:rPr lang="fr-FR" sz="2000" dirty="0"/>
+              <a:t> Installation de bibliothèques tierces sur Windows (SSL</a:t>
+            </a:r>
+            <a:r>
+              <a:rPr lang="fr-FR" sz="2000" dirty="0" smtClean="0"/>
+              <a:t>).</a:t>
+            </a:r>
+          </a:p>
+          <a:p>
+            <a:pPr lvl="0">
+              <a:buClr>
+                <a:srgbClr val="000000"/>
+              </a:buClr>
+              <a:buSzPct val="45000"/>
+              <a:buFont typeface="StarSymbol"/>
+              <a:buChar char="●"/>
+            </a:pPr>
+            <a:r>
+              <a:rPr lang="fr-FR" sz="2000" dirty="0"/>
+              <a:t> </a:t>
+            </a:r>
+            <a:r>
+              <a:rPr lang="fr-FR" sz="2000" dirty="0" smtClean="0"/>
+              <a:t>Dépendances circulaires.</a:t>
+            </a:r>
+            <a:endParaRPr lang="fr-FR" sz="2000" dirty="0"/>
+          </a:p>
+        </p:txBody>
+      </p:sp>
+      <p:sp>
+        <p:nvSpPr>
+          <p:cNvPr id="5" name="Titre 4"/>
+          <p:cNvSpPr txBox="1">
+            <a:spLocks noGrp="1"/>
+          </p:cNvSpPr>
+          <p:nvPr>
+            <p:ph type="title" idx="4294967295"/>
+          </p:nvPr>
+        </p:nvSpPr>
+        <p:spPr>
+          <a:xfrm>
+            <a:off x="359999" y="1506153"/>
+            <a:ext cx="5327998" cy="564120"/>
+          </a:xfrm>
+        </p:spPr>
+        <p:txBody>
+          <a:bodyPr anchorCtr="0"/>
+          <a:lstStyle/>
+          <a:p>
+            <a:pPr lvl="0" algn="l"/>
+            <a:r>
+              <a:rPr lang="fr-CH" sz="2800"/>
+              <a:t>Problèmes organisationnels</a:t>
+            </a:r>
+          </a:p>
+        </p:txBody>
+      </p:sp>
+      <p:sp>
+        <p:nvSpPr>
+          <p:cNvPr id="6" name="Titre 5"/>
+          <p:cNvSpPr txBox="1">
+            <a:spLocks noGrp="1"/>
+          </p:cNvSpPr>
+          <p:nvPr>
+            <p:ph type="title" idx="4294967295"/>
+          </p:nvPr>
+        </p:nvSpPr>
+        <p:spPr>
+          <a:xfrm>
+            <a:off x="359999" y="4098441"/>
+            <a:ext cx="5327998" cy="564120"/>
+          </a:xfrm>
+        </p:spPr>
+        <p:txBody>
+          <a:bodyPr anchorCtr="0"/>
+          <a:lstStyle/>
+          <a:p>
+            <a:pPr lvl="0" algn="l"/>
+            <a:r>
+              <a:rPr lang="fr-CH" sz="2800"/>
+              <a:t>Problèmes techniques</a:t>
+            </a:r>
+          </a:p>
+        </p:txBody>
+      </p:sp>
+      <p:pic>
+        <p:nvPicPr>
+          <p:cNvPr id="7" name="Image 6"/>
+          <p:cNvPicPr>
+            <a:picLocks noChangeAspect="1"/>
+          </p:cNvPicPr>
+          <p:nvPr/>
+        </p:nvPicPr>
+        <p:blipFill>
+          <a:blip r:embed="rId3">
+            <a:lum/>
+            <a:alphaModFix/>
+          </a:blip>
+          <a:srcRect/>
+          <a:stretch>
+            <a:fillRect/>
+          </a:stretch>
+        </p:blipFill>
+        <p:spPr>
+          <a:xfrm>
+            <a:off x="287999" y="195837"/>
+            <a:ext cx="1151997" cy="1082878"/>
+          </a:xfrm>
+          <a:prstGeom prst="rect">
+            <a:avLst/>
+          </a:prstGeom>
+          <a:noFill/>
+          <a:ln>
+            <a:noFill/>
+          </a:ln>
+        </p:spPr>
+      </p:pic>
+      <p:pic>
+        <p:nvPicPr>
+          <p:cNvPr id="8" name="Picture 6" descr="C:\Users\Miguel\Copy\Cours\2ème_année\PRO\ProjetChat2015\build-Chat-Desktop_Qt_5_4_0_MSVC2012_OpenGL_32bit-Debug\img\dislike.png"/>
+          <p:cNvPicPr>
+            <a:picLocks noChangeAspect="1"/>
+          </p:cNvPicPr>
+          <p:nvPr/>
+        </p:nvPicPr>
+        <p:blipFill>
+          <a:blip r:embed="rId4"/>
+          <a:srcRect/>
+          <a:stretch>
+            <a:fillRect/>
+          </a:stretch>
+        </p:blipFill>
+        <p:spPr>
+          <a:xfrm>
+            <a:off x="8568833" y="202192"/>
+            <a:ext cx="1151997" cy="1148001"/>
+          </a:xfrm>
+          <a:prstGeom prst="rect">
+            <a:avLst/>
+          </a:prstGeom>
+          <a:noFill/>
+          <a:ln>
+            <a:noFill/>
+          </a:ln>
+        </p:spPr>
+      </p:pic>
+      <p:sp>
+        <p:nvSpPr>
+          <p:cNvPr id="9" name="ZoneTexte 11"/>
+          <p:cNvSpPr txBox="1"/>
+          <p:nvPr/>
+        </p:nvSpPr>
+        <p:spPr>
+          <a:xfrm>
+            <a:off x="9723592" y="5877406"/>
+            <a:ext cx="285274" cy="369335"/>
+          </a:xfrm>
+          <a:prstGeom prst="rect">
+            <a:avLst/>
+          </a:prstGeom>
+          <a:noFill/>
+          <a:ln>
+            <a:noFill/>
+          </a:ln>
+        </p:spPr>
+        <p:txBody>
+          <a:bodyPr vert="horz" wrap="square" lIns="91440" tIns="45720" rIns="91440" bIns="45720" anchor="t" anchorCtr="0" compatLnSpc="1">
+            <a:spAutoFit/>
+          </a:bodyPr>
+          <a:lstStyle/>
+          <a:p>
+            <a:pPr marL="0" marR="0" lvl="0" indent="0" algn="l" defTabSz="914400" rtl="0" fontAlgn="auto" hangingPunct="1">
+              <a:lnSpc>
+                <a:spcPct val="100000"/>
+              </a:lnSpc>
+              <a:spcBef>
+                <a:spcPts val="0"/>
+              </a:spcBef>
+              <a:spcAft>
+                <a:spcPts val="0"/>
+              </a:spcAft>
+              <a:buNone/>
+              <a:tabLst/>
+              <a:defRPr sz="1800" b="0" i="0" u="none" strike="noStrike" kern="0" cap="none" spc="0" baseline="0">
+                <a:solidFill>
+                  <a:srgbClr val="000000"/>
+                </a:solidFill>
+                <a:uFillTx/>
+              </a:defRPr>
+            </a:pPr>
+            <a:r>
+              <a:rPr lang="fr-CH" sz="1800" b="0" i="0" u="none" strike="noStrike" kern="1200" cap="none" spc="0" baseline="0" dirty="0" smtClean="0">
+                <a:solidFill>
+                  <a:srgbClr val="000000"/>
+                </a:solidFill>
+                <a:uFillTx/>
+                <a:latin typeface="Calibri"/>
+              </a:rPr>
+              <a:t>9</a:t>
+            </a:r>
+            <a:endParaRPr lang="fr-CH" sz="1800" b="0" i="0" u="none" strike="noStrike" kern="1200" cap="none" spc="0" baseline="0" dirty="0">
+              <a:solidFill>
+                <a:srgbClr val="000000"/>
+              </a:solidFill>
+              <a:uFillTx/>
+              <a:latin typeface="Calibri"/>
+            </a:endParaRPr>
+          </a:p>
+        </p:txBody>
+      </p:sp>
+    </p:spTree>
+  </p:cSld>
+  <p:clrMapOvr>
+    <a:masterClrMapping/>
+  </p:clrMapOvr>
+  <p:transition spd="med">
+    <p:fade/>
+  </p:transition>
+  <p:timing>
+    <p:tnLst>
+      <p:par>
+        <p:cTn id="1" dur="indefinite" restart="never" nodeType="tmRoot"/>
+      </p:par>
+    </p:tnLst>
+  </p:timing>
+</p:sld>
+</file>
+
+<file path=ppt/slides/slide11.xml><?xml version="1.0" encoding="utf-8"?>
 <p:sld xmlns:a="http://schemas.openxmlformats.org/drawingml/2006/main" xmlns:r="http://schemas.openxmlformats.org/officeDocument/2006/relationships" xmlns:p="http://schemas.openxmlformats.org/presentationml/2006/main">
   <p:cSld name="Slide11">
     <p:spTree>
@@ -5769,7 +6260,7 @@
         </p:nvSpPr>
         <p:spPr>
           <a:xfrm>
-            <a:off x="503276" y="1803525"/>
+            <a:off x="563275" y="1790643"/>
             <a:ext cx="9217554" cy="3651116"/>
           </a:xfrm>
           <a:prstGeom prst="rect">
@@ -6162,8 +6653,8 @@
         </p:nvSpPr>
         <p:spPr>
           <a:xfrm>
-            <a:off x="9723592" y="5877406"/>
-            <a:ext cx="285274" cy="369335"/>
+            <a:off x="9570960" y="5877406"/>
+            <a:ext cx="437906" cy="369332"/>
           </a:xfrm>
           <a:prstGeom prst="rect">
             <a:avLst/>
@@ -6199,15 +6690,22 @@
               </a:defRPr>
             </a:pPr>
             <a:r>
-              <a:rPr lang="fr-CH" sz="1800" b="0" i="0" u="none" strike="noStrike" kern="1200" cap="none" spc="0" baseline="0">
+              <a:rPr lang="fr-CH" sz="1800" b="0" i="0" u="none" strike="noStrike" kern="1200" cap="none" spc="0" baseline="0" dirty="0" smtClean="0">
                 <a:solidFill>
                   <a:srgbClr val="000000"/>
                 </a:solidFill>
                 <a:uFillTx/>
                 <a:latin typeface="Calibri"/>
               </a:rPr>
-              <a:t>9</a:t>
-            </a:r>
+              <a:t>10</a:t>
+            </a:r>
+            <a:endParaRPr lang="fr-CH" sz="1800" b="0" i="0" u="none" strike="noStrike" kern="1200" cap="none" spc="0" baseline="0" dirty="0">
+              <a:solidFill>
+                <a:srgbClr val="000000"/>
+              </a:solidFill>
+              <a:uFillTx/>
+              <a:latin typeface="Calibri"/>
+            </a:endParaRPr>
           </a:p>
         </p:txBody>
       </p:sp>
@@ -6216,13 +6714,13 @@
   <p:clrMapOvr>
     <a:masterClrMapping/>
   </p:clrMapOvr>
-  <mc:AlternateContent xmlns:mc="http://schemas.openxmlformats.org/markup-compatibility/2006">
-    <mc:Choice xmlns:p14="http://schemas.microsoft.com/office/powerpoint/2010/main" Requires="p14">
+  <mc:AlternateContent xmlns:mc="http://schemas.openxmlformats.org/markup-compatibility/2006" xmlns:p14="http://schemas.microsoft.com/office/powerpoint/2010/main">
+    <mc:Choice Requires="p14">
       <p:transition spd="med" p14:dur="700">
         <p:fade/>
       </p:transition>
     </mc:Choice>
-    <mc:Fallback>
+    <mc:Fallback xmlns="">
       <p:transition spd="med">
         <p:fade/>
       </p:transition>
@@ -6238,7 +6736,7 @@
 </p:sld>
 </file>
 
-<file path=ppt/slides/slide11.xml><?xml version="1.0" encoding="utf-8"?>
+<file path=ppt/slides/slide12.xml><?xml version="1.0" encoding="utf-8"?>
 <p:sld xmlns:a="http://schemas.openxmlformats.org/drawingml/2006/main" xmlns:r="http://schemas.openxmlformats.org/officeDocument/2006/relationships" xmlns:p="http://schemas.openxmlformats.org/presentationml/2006/main">
   <p:cSld name="page8">
     <p:spTree>
@@ -6272,7 +6770,7 @@
           <a:p>
             <a:pPr lvl="0"/>
             <a:r>
-              <a:rPr lang="fr-CH" sz="4000"/>
+              <a:rPr lang="fr-CH" sz="4000" dirty="0"/>
               <a:t>Bilan</a:t>
             </a:r>
           </a:p>
@@ -6470,8 +6968,8 @@
         </p:nvSpPr>
         <p:spPr>
           <a:xfrm>
-            <a:off x="9723592" y="5877406"/>
-            <a:ext cx="285274" cy="369335"/>
+            <a:off x="9576816" y="5877406"/>
+            <a:ext cx="432050" cy="369332"/>
           </a:xfrm>
           <a:prstGeom prst="rect">
             <a:avLst/>
@@ -6507,15 +7005,22 @@
               </a:defRPr>
             </a:pPr>
             <a:r>
-              <a:rPr lang="fr-CH" sz="1800" b="0" i="0" u="none" strike="noStrike" kern="1200" cap="none" spc="0" baseline="0">
+              <a:rPr lang="fr-CH" sz="1800" b="0" i="0" u="none" strike="noStrike" kern="1200" cap="none" spc="0" baseline="0" dirty="0" smtClean="0">
                 <a:solidFill>
                   <a:srgbClr val="000000"/>
                 </a:solidFill>
                 <a:uFillTx/>
                 <a:latin typeface="Calibri"/>
               </a:rPr>
-              <a:t>9</a:t>
-            </a:r>
+              <a:t>11</a:t>
+            </a:r>
+            <a:endParaRPr lang="fr-CH" sz="1800" b="0" i="0" u="none" strike="noStrike" kern="1200" cap="none" spc="0" baseline="0" dirty="0">
+              <a:solidFill>
+                <a:srgbClr val="000000"/>
+              </a:solidFill>
+              <a:uFillTx/>
+              <a:latin typeface="Calibri"/>
+            </a:endParaRPr>
           </a:p>
         </p:txBody>
       </p:sp>
@@ -6537,7 +7042,7 @@
 </p:sld>
 </file>
 
-<file path=ppt/slides/slide12.xml><?xml version="1.0" encoding="utf-8"?>
+<file path=ppt/slides/slide13.xml><?xml version="1.0" encoding="utf-8"?>
 <p:sld xmlns:a="http://schemas.openxmlformats.org/drawingml/2006/main" xmlns:r="http://schemas.openxmlformats.org/officeDocument/2006/relationships" xmlns:p="http://schemas.openxmlformats.org/presentationml/2006/main">
   <p:cSld name="page10">
     <p:spTree>
@@ -6609,63 +7114,6 @@
           </a:ln>
         </p:spPr>
       </p:pic>
-      <p:sp>
-        <p:nvSpPr>
-          <p:cNvPr id="4" name="ZoneTexte 6"/>
-          <p:cNvSpPr txBox="1"/>
-          <p:nvPr/>
-        </p:nvSpPr>
-        <p:spPr>
-          <a:xfrm>
-            <a:off x="9576812" y="5877406"/>
-            <a:ext cx="432044" cy="369335"/>
-          </a:xfrm>
-          <a:prstGeom prst="rect">
-            <a:avLst/>
-          </a:prstGeom>
-          <a:noFill/>
-          <a:ln>
-            <a:noFill/>
-          </a:ln>
-        </p:spPr>
-        <p:txBody>
-          <a:bodyPr vert="horz" wrap="square" lIns="91440" tIns="45720" rIns="91440" bIns="45720" anchor="t" anchorCtr="0" compatLnSpc="1">
-            <a:spAutoFit/>
-          </a:bodyPr>
-          <a:lstStyle/>
-          <a:p>
-            <a:pPr marL="0" marR="0" lvl="0" indent="0" algn="l" defTabSz="914400" rtl="0" fontAlgn="auto" hangingPunct="1">
-              <a:lnSpc>
-                <a:spcPct val="100000"/>
-              </a:lnSpc>
-              <a:spcBef>
-                <a:spcPts val="0"/>
-              </a:spcBef>
-              <a:spcAft>
-                <a:spcPts val="0"/>
-              </a:spcAft>
-              <a:buNone/>
-              <a:tabLst/>
-              <a:defRPr sz="1800" b="0" i="0" u="none" strike="noStrike" kern="0" cap="none" spc="0" baseline="0">
-                <a:solidFill>
-                  <a:srgbClr val="000000"/>
-                </a:solidFill>
-                <a:uFillTx/>
-              </a:defRPr>
-            </a:pPr>
-            <a:r>
-              <a:rPr lang="fr-CH" sz="1800" b="0" i="0" u="none" strike="noStrike" kern="1200" cap="none" spc="0" baseline="0">
-                <a:solidFill>
-                  <a:srgbClr val="000000"/>
-                </a:solidFill>
-                <a:uFillTx/>
-                <a:latin typeface="Calibri"/>
-              </a:rPr>
-              <a:t>10</a:t>
-            </a:r>
-          </a:p>
-        </p:txBody>
-      </p:sp>
     </p:spTree>
   </p:cSld>
   <p:clrMapOvr>
@@ -7262,7 +7710,7 @@
           <a:p>
             <a:pPr lvl="0"/>
             <a:r>
-              <a:rPr lang="fr-CH" sz="4000"/>
+              <a:rPr lang="fr-CH" sz="4000" dirty="0"/>
               <a:t>Schéma général</a:t>
             </a:r>
           </a:p>
@@ -7290,38 +7738,6 @@
           <a:xfrm>
             <a:off x="287999" y="195837"/>
             <a:ext cx="1151997" cy="1082878"/>
-          </a:xfrm>
-          <a:prstGeom prst="rect">
-            <a:avLst/>
-          </a:prstGeom>
-          <a:noFill/>
-          <a:ln>
-            <a:noFill/>
-          </a:ln>
-        </p:spPr>
-      </p:pic>
-      <p:pic>
-        <p:nvPicPr>
-          <p:cNvPr id="4" name="Image 3"/>
-          <p:cNvPicPr>
-            <a:picLocks noChangeAspect="1"/>
-          </p:cNvPicPr>
-          <p:nvPr/>
-        </p:nvPicPr>
-        <p:blipFill>
-          <a:blip r:embed="rId4">
-            <a:lum/>
-            <a:alphaModFix/>
-          </a:blip>
-          <a:srcRect/>
-          <a:stretch>
-            <a:fillRect/>
-          </a:stretch>
-        </p:blipFill>
-        <p:spPr>
-          <a:xfrm>
-            <a:off x="2237043" y="1024201"/>
-            <a:ext cx="5605921" cy="5123876"/>
           </a:xfrm>
           <a:prstGeom prst="rect">
             <a:avLst/>
@@ -7421,6 +7837,47 @@
           </a:p>
         </p:txBody>
       </p:sp>
+      <p:pic>
+        <p:nvPicPr>
+          <p:cNvPr id="1026" name="Picture 2" descr="C:\Users\Miguel\Copy\Cours\2ème_année\PRO\Documentation\Présentation intermédiaire\schéma_simple.png"/>
+          <p:cNvPicPr>
+            <a:picLocks noChangeAspect="1" noChangeArrowheads="1"/>
+          </p:cNvPicPr>
+          <p:nvPr/>
+        </p:nvPicPr>
+        <p:blipFill>
+          <a:blip r:embed="rId4" cstate="print">
+            <a:extLst>
+              <a:ext uri="{28A0092B-C50C-407E-A947-70E740481C1C}">
+                <a14:useLocalDpi xmlns:a14="http://schemas.microsoft.com/office/drawing/2010/main" val="0"/>
+              </a:ext>
+            </a:extLst>
+          </a:blip>
+          <a:srcRect/>
+          <a:stretch>
+            <a:fillRect/>
+          </a:stretch>
+        </p:blipFill>
+        <p:spPr bwMode="auto">
+          <a:xfrm>
+            <a:off x="3024088" y="630114"/>
+            <a:ext cx="4456003" cy="6300788"/>
+          </a:xfrm>
+          <a:prstGeom prst="rect">
+            <a:avLst/>
+          </a:prstGeom>
+          <a:noFill/>
+          <a:extLst>
+            <a:ext uri="{909E8E84-426E-40DD-AFC4-6F175D3DCCD1}">
+              <a14:hiddenFill xmlns:a14="http://schemas.microsoft.com/office/drawing/2010/main">
+                <a:solidFill>
+                  <a:srgbClr val="FFFFFF"/>
+                </a:solidFill>
+              </a14:hiddenFill>
+            </a:ext>
+          </a:extLst>
+        </p:spPr>
+      </p:pic>
     </p:spTree>
   </p:cSld>
   <p:clrMapOvr>
@@ -7440,6 +7897,238 @@
 </file>
 
 <file path=ppt/slides/slide5.xml><?xml version="1.0" encoding="utf-8"?>
+<p:sld xmlns:a="http://schemas.openxmlformats.org/drawingml/2006/main" xmlns:r="http://schemas.openxmlformats.org/officeDocument/2006/relationships" xmlns:p="http://schemas.openxmlformats.org/presentationml/2006/main">
+  <p:cSld>
+    <p:spTree>
+      <p:nvGrpSpPr>
+        <p:cNvPr id="1" name=""/>
+        <p:cNvGrpSpPr/>
+        <p:nvPr/>
+      </p:nvGrpSpPr>
+      <p:grpSpPr>
+        <a:xfrm>
+          <a:off x="0" y="0"/>
+          <a:ext cx="0" cy="0"/>
+          <a:chOff x="0" y="0"/>
+          <a:chExt cx="0" cy="0"/>
+        </a:xfrm>
+      </p:grpSpPr>
+      <p:sp>
+        <p:nvSpPr>
+          <p:cNvPr id="2" name="Titre 1"/>
+          <p:cNvSpPr txBox="1">
+            <a:spLocks noGrp="1"/>
+          </p:cNvSpPr>
+          <p:nvPr>
+            <p:ph type="title" idx="4294967295"/>
+          </p:nvPr>
+        </p:nvSpPr>
+        <p:spPr/>
+        <p:txBody>
+          <a:bodyPr/>
+          <a:lstStyle/>
+          <a:p>
+            <a:pPr lvl="0"/>
+            <a:r>
+              <a:rPr lang="fr-CH" sz="4000" dirty="0"/>
+              <a:t>Schéma général</a:t>
+            </a:r>
+          </a:p>
+        </p:txBody>
+      </p:sp>
+      <p:pic>
+        <p:nvPicPr>
+          <p:cNvPr id="3" name="Image 2"/>
+          <p:cNvPicPr>
+            <a:picLocks noChangeAspect="1"/>
+          </p:cNvPicPr>
+          <p:nvPr/>
+        </p:nvPicPr>
+        <p:blipFill>
+          <a:blip r:embed="rId3">
+            <a:lum/>
+            <a:alphaModFix/>
+          </a:blip>
+          <a:srcRect/>
+          <a:stretch>
+            <a:fillRect/>
+          </a:stretch>
+        </p:blipFill>
+        <p:spPr>
+          <a:xfrm>
+            <a:off x="287999" y="195837"/>
+            <a:ext cx="1151997" cy="1082878"/>
+          </a:xfrm>
+          <a:prstGeom prst="rect">
+            <a:avLst/>
+          </a:prstGeom>
+          <a:noFill/>
+          <a:ln>
+            <a:noFill/>
+          </a:ln>
+        </p:spPr>
+      </p:pic>
+      <p:pic>
+        <p:nvPicPr>
+          <p:cNvPr id="5" name="Image 8"/>
+          <p:cNvPicPr>
+            <a:picLocks noChangeAspect="1"/>
+          </p:cNvPicPr>
+          <p:nvPr/>
+        </p:nvPicPr>
+        <p:blipFill>
+          <a:blip r:embed="rId3">
+            <a:lum/>
+            <a:alphaModFix/>
+          </a:blip>
+          <a:srcRect/>
+          <a:stretch>
+            <a:fillRect/>
+          </a:stretch>
+        </p:blipFill>
+        <p:spPr>
+          <a:xfrm flipH="1">
+            <a:off x="8640842" y="195837"/>
+            <a:ext cx="1151997" cy="1082494"/>
+          </a:xfrm>
+          <a:prstGeom prst="rect">
+            <a:avLst/>
+          </a:prstGeom>
+          <a:noFill/>
+          <a:ln>
+            <a:noFill/>
+          </a:ln>
+        </p:spPr>
+      </p:pic>
+      <p:sp>
+        <p:nvSpPr>
+          <p:cNvPr id="6" name="ZoneTexte 8"/>
+          <p:cNvSpPr txBox="1"/>
+          <p:nvPr/>
+        </p:nvSpPr>
+        <p:spPr>
+          <a:xfrm>
+            <a:off x="9723592" y="5877406"/>
+            <a:ext cx="285274" cy="369335"/>
+          </a:xfrm>
+          <a:prstGeom prst="rect">
+            <a:avLst/>
+          </a:prstGeom>
+          <a:noFill/>
+          <a:ln>
+            <a:noFill/>
+          </a:ln>
+        </p:spPr>
+        <p:txBody>
+          <a:bodyPr vert="horz" wrap="square" lIns="91440" tIns="45720" rIns="91440" bIns="45720" anchor="t" anchorCtr="0" compatLnSpc="1">
+            <a:spAutoFit/>
+          </a:bodyPr>
+          <a:lstStyle/>
+          <a:p>
+            <a:pPr marL="0" marR="0" lvl="0" indent="0" algn="l" defTabSz="914400" rtl="0" fontAlgn="auto" hangingPunct="1">
+              <a:lnSpc>
+                <a:spcPct val="100000"/>
+              </a:lnSpc>
+              <a:spcBef>
+                <a:spcPts val="0"/>
+              </a:spcBef>
+              <a:spcAft>
+                <a:spcPts val="0"/>
+              </a:spcAft>
+              <a:buNone/>
+              <a:tabLst/>
+              <a:defRPr sz="1800" b="0" i="0" u="none" strike="noStrike" kern="0" cap="none" spc="0" baseline="0">
+                <a:solidFill>
+                  <a:srgbClr val="000000"/>
+                </a:solidFill>
+                <a:uFillTx/>
+              </a:defRPr>
+            </a:pPr>
+            <a:r>
+              <a:rPr lang="fr-CH" sz="1800" b="0" i="0" u="none" strike="noStrike" kern="1200" cap="none" spc="0" baseline="0" dirty="0" smtClean="0">
+                <a:solidFill>
+                  <a:srgbClr val="000000"/>
+                </a:solidFill>
+                <a:uFillTx/>
+                <a:latin typeface="Calibri"/>
+              </a:rPr>
+              <a:t>4</a:t>
+            </a:r>
+            <a:endParaRPr lang="fr-CH" sz="1800" b="0" i="0" u="none" strike="noStrike" kern="1200" cap="none" spc="0" baseline="0" dirty="0">
+              <a:solidFill>
+                <a:srgbClr val="000000"/>
+              </a:solidFill>
+              <a:uFillTx/>
+              <a:latin typeface="Calibri"/>
+            </a:endParaRPr>
+          </a:p>
+        </p:txBody>
+      </p:sp>
+      <p:pic>
+        <p:nvPicPr>
+          <p:cNvPr id="2050" name="Picture 2" descr="C:\Users\Miguel\Copy\Cours\2ème_année\PRO\Documentation\Présentation intermédiaire\schéma_simple_serveur.png"/>
+          <p:cNvPicPr>
+            <a:picLocks noChangeAspect="1" noChangeArrowheads="1"/>
+          </p:cNvPicPr>
+          <p:nvPr/>
+        </p:nvPicPr>
+        <p:blipFill>
+          <a:blip r:embed="rId4">
+            <a:extLst>
+              <a:ext uri="{28A0092B-C50C-407E-A947-70E740481C1C}">
+                <a14:useLocalDpi xmlns:a14="http://schemas.microsoft.com/office/drawing/2010/main" val="0"/>
+              </a:ext>
+            </a:extLst>
+          </a:blip>
+          <a:srcRect/>
+          <a:stretch>
+            <a:fillRect/>
+          </a:stretch>
+        </p:blipFill>
+        <p:spPr bwMode="auto">
+          <a:xfrm>
+            <a:off x="586538" y="738038"/>
+            <a:ext cx="8907549" cy="6300788"/>
+          </a:xfrm>
+          <a:prstGeom prst="rect">
+            <a:avLst/>
+          </a:prstGeom>
+          <a:noFill/>
+          <a:extLst>
+            <a:ext uri="{909E8E84-426E-40DD-AFC4-6F175D3DCCD1}">
+              <a14:hiddenFill xmlns:a14="http://schemas.microsoft.com/office/drawing/2010/main">
+                <a:solidFill>
+                  <a:srgbClr val="FFFFFF"/>
+                </a:solidFill>
+              </a14:hiddenFill>
+            </a:ext>
+          </a:extLst>
+        </p:spPr>
+      </p:pic>
+    </p:spTree>
+    <p:extLst>
+      <p:ext uri="{BB962C8B-B14F-4D97-AF65-F5344CB8AC3E}">
+        <p14:creationId xmlns:p14="http://schemas.microsoft.com/office/powerpoint/2010/main" val="1287761580"/>
+      </p:ext>
+    </p:extLst>
+  </p:cSld>
+  <p:clrMapOvr>
+    <a:masterClrMapping/>
+  </p:clrMapOvr>
+  <p:transition spd="med">
+    <p:fade/>
+  </p:transition>
+  <p:timing>
+    <p:tnLst>
+      <p:par>
+        <p:cTn id="1" dur="indefinite" restart="never" nodeType="tmRoot"/>
+      </p:par>
+    </p:tnLst>
+  </p:timing>
+</p:sld>
+</file>
+
+<file path=ppt/slides/slide6.xml><?xml version="1.0" encoding="utf-8"?>
 <p:sld xmlns:a="http://schemas.openxmlformats.org/drawingml/2006/main" xmlns:r="http://schemas.openxmlformats.org/officeDocument/2006/relationships" xmlns:p="http://schemas.openxmlformats.org/presentationml/2006/main">
   <p:cSld name="page4">
     <p:spTree>
@@ -7598,15 +8287,22 @@
               </a:defRPr>
             </a:pPr>
             <a:r>
-              <a:rPr lang="fr-CH" sz="1800" b="0" i="0" u="none" strike="noStrike" kern="1200" cap="none" spc="0" baseline="0">
+              <a:rPr lang="fr-CH" sz="1800" b="0" i="0" u="none" strike="noStrike" kern="1200" cap="none" spc="0" baseline="0" dirty="0" smtClean="0">
                 <a:solidFill>
                   <a:srgbClr val="000000"/>
                 </a:solidFill>
                 <a:uFillTx/>
                 <a:latin typeface="Calibri"/>
               </a:rPr>
-              <a:t>4</a:t>
-            </a:r>
+              <a:t>5</a:t>
+            </a:r>
+            <a:endParaRPr lang="fr-CH" sz="1800" b="0" i="0" u="none" strike="noStrike" kern="1200" cap="none" spc="0" baseline="0" dirty="0">
+              <a:solidFill>
+                <a:srgbClr val="000000"/>
+              </a:solidFill>
+              <a:uFillTx/>
+              <a:latin typeface="Calibri"/>
+            </a:endParaRPr>
           </a:p>
         </p:txBody>
       </p:sp>
@@ -7682,7 +8378,7 @@
 </p:sld>
 </file>
 
-<file path=ppt/slides/slide6.xml><?xml version="1.0" encoding="utf-8"?>
+<file path=ppt/slides/slide7.xml><?xml version="1.0" encoding="utf-8"?>
 <p:sld xmlns:a="http://schemas.openxmlformats.org/drawingml/2006/main" xmlns:r="http://schemas.openxmlformats.org/officeDocument/2006/relationships" xmlns:p="http://schemas.openxmlformats.org/presentationml/2006/main">
   <p:cSld name="page5">
     <p:spTree>
@@ -7833,15 +8529,22 @@
               </a:defRPr>
             </a:pPr>
             <a:r>
-              <a:rPr lang="fr-CH" sz="1800" b="0" i="0" u="none" strike="noStrike" kern="1200" cap="none" spc="0" baseline="0">
+              <a:rPr lang="fr-CH" sz="1800" b="0" i="0" u="none" strike="noStrike" kern="1200" cap="none" spc="0" baseline="0" dirty="0" smtClean="0">
                 <a:solidFill>
                   <a:srgbClr val="000000"/>
                 </a:solidFill>
                 <a:uFillTx/>
                 <a:latin typeface="Calibri"/>
               </a:rPr>
-              <a:t>5</a:t>
-            </a:r>
+              <a:t>6</a:t>
+            </a:r>
+            <a:endParaRPr lang="fr-CH" sz="1800" b="0" i="0" u="none" strike="noStrike" kern="1200" cap="none" spc="0" baseline="0" dirty="0">
+              <a:solidFill>
+                <a:srgbClr val="000000"/>
+              </a:solidFill>
+              <a:uFillTx/>
+              <a:latin typeface="Calibri"/>
+            </a:endParaRPr>
           </a:p>
         </p:txBody>
       </p:sp>
@@ -7917,7 +8620,7 @@
 </p:sld>
 </file>
 
-<file path=ppt/slides/slide7.xml><?xml version="1.0" encoding="utf-8"?>
+<file path=ppt/slides/slide8.xml><?xml version="1.0" encoding="utf-8"?>
 <p:sld xmlns:a="http://schemas.openxmlformats.org/drawingml/2006/main" xmlns:r="http://schemas.openxmlformats.org/officeDocument/2006/relationships" xmlns:p="http://schemas.openxmlformats.org/presentationml/2006/main">
   <p:cSld name="page6">
     <p:spTree>
@@ -8280,15 +8983,22 @@
               </a:defRPr>
             </a:pPr>
             <a:r>
-              <a:rPr lang="fr-CH" sz="1800" b="0" i="0" u="none" strike="noStrike" kern="1200" cap="none" spc="0" baseline="0">
+              <a:rPr lang="fr-CH" sz="1800" b="0" i="0" u="none" strike="noStrike" kern="1200" cap="none" spc="0" baseline="0" dirty="0" smtClean="0">
                 <a:solidFill>
                   <a:srgbClr val="000000"/>
                 </a:solidFill>
                 <a:uFillTx/>
                 <a:latin typeface="Calibri"/>
               </a:rPr>
-              <a:t>6</a:t>
-            </a:r>
+              <a:t>7</a:t>
+            </a:r>
+            <a:endParaRPr lang="fr-CH" sz="1800" b="0" i="0" u="none" strike="noStrike" kern="1200" cap="none" spc="0" baseline="0" dirty="0">
+              <a:solidFill>
+                <a:srgbClr val="000000"/>
+              </a:solidFill>
+              <a:uFillTx/>
+              <a:latin typeface="Calibri"/>
+            </a:endParaRPr>
           </a:p>
         </p:txBody>
       </p:sp>
@@ -8310,7 +9020,7 @@
 </p:sld>
 </file>
 
-<file path=ppt/slides/slide8.xml><?xml version="1.0" encoding="utf-8"?>
+<file path=ppt/slides/slide9.xml><?xml version="1.0" encoding="utf-8"?>
 <p:sld xmlns:a="http://schemas.openxmlformats.org/drawingml/2006/main" xmlns:r="http://schemas.openxmlformats.org/officeDocument/2006/relationships" xmlns:p="http://schemas.openxmlformats.org/presentationml/2006/main">
   <p:cSld name="Slide12">
     <p:spTree>
@@ -8954,397 +9664,7 @@
               </a:defRPr>
             </a:pPr>
             <a:r>
-              <a:rPr lang="fr-CH" sz="1800" b="0" i="0" u="none" strike="noStrike" kern="1200" cap="none" spc="0" baseline="0">
-                <a:solidFill>
-                  <a:srgbClr val="000000"/>
-                </a:solidFill>
-                <a:uFillTx/>
-                <a:latin typeface="Calibri"/>
-              </a:rPr>
-              <a:t>7</a:t>
-            </a:r>
-          </a:p>
-        </p:txBody>
-      </p:sp>
-    </p:spTree>
-  </p:cSld>
-  <p:clrMapOvr>
-    <a:masterClrMapping/>
-  </p:clrMapOvr>
-  <mc:AlternateContent xmlns:mc="http://schemas.openxmlformats.org/markup-compatibility/2006">
-    <mc:Choice xmlns:p14="http://schemas.microsoft.com/office/powerpoint/2010/main" Requires="p14">
-      <p:transition spd="med" p14:dur="700">
-        <p:fade/>
-      </p:transition>
-    </mc:Choice>
-    <mc:Fallback>
-      <p:transition spd="med">
-        <p:fade/>
-      </p:transition>
-    </mc:Fallback>
-  </mc:AlternateContent>
-  <p:timing>
-    <p:tnLst>
-      <p:par>
-        <p:cTn id="1" dur="indefinite" restart="never" nodeType="tmRoot"/>
-      </p:par>
-    </p:tnLst>
-  </p:timing>
-</p:sld>
-</file>
-
-<file path=ppt/slides/slide9.xml><?xml version="1.0" encoding="utf-8"?>
-<p:sld xmlns:a="http://schemas.openxmlformats.org/drawingml/2006/main" xmlns:r="http://schemas.openxmlformats.org/officeDocument/2006/relationships" xmlns:p="http://schemas.openxmlformats.org/presentationml/2006/main">
-  <p:cSld name="page7">
-    <p:spTree>
-      <p:nvGrpSpPr>
-        <p:cNvPr id="1" name=""/>
-        <p:cNvGrpSpPr/>
-        <p:nvPr/>
-      </p:nvGrpSpPr>
-      <p:grpSpPr>
-        <a:xfrm>
-          <a:off x="0" y="0"/>
-          <a:ext cx="0" cy="0"/>
-          <a:chOff x="0" y="0"/>
-          <a:chExt cx="0" cy="0"/>
-        </a:xfrm>
-      </p:grpSpPr>
-      <p:sp>
-        <p:nvSpPr>
-          <p:cNvPr id="2" name="Titre 1"/>
-          <p:cNvSpPr txBox="1">
-            <a:spLocks noGrp="1"/>
-          </p:cNvSpPr>
-          <p:nvPr>
-            <p:ph type="title" idx="4294967295"/>
-          </p:nvPr>
-        </p:nvSpPr>
-        <p:spPr/>
-        <p:txBody>
-          <a:bodyPr/>
-          <a:lstStyle/>
-          <a:p>
-            <a:pPr lvl="0"/>
-            <a:r>
-              <a:rPr lang="fr-CH"/>
-              <a:t>Problèmes Rencontrés</a:t>
-            </a:r>
-          </a:p>
-        </p:txBody>
-      </p:sp>
-      <p:sp>
-        <p:nvSpPr>
-          <p:cNvPr id="3" name="Espace réservé du texte 2"/>
-          <p:cNvSpPr txBox="1">
-            <a:spLocks noGrp="1"/>
-          </p:cNvSpPr>
-          <p:nvPr>
-            <p:ph type="body" idx="4294967295"/>
-          </p:nvPr>
-        </p:nvSpPr>
-        <p:spPr>
-          <a:xfrm>
-            <a:off x="647998" y="2214457"/>
-            <a:ext cx="9067684" cy="1511996"/>
-          </a:xfrm>
-        </p:spPr>
-        <p:txBody>
-          <a:bodyPr/>
-          <a:lstStyle/>
-          <a:p>
-            <a:pPr lvl="0">
-              <a:buClr>
-                <a:srgbClr val="000000"/>
-              </a:buClr>
-              <a:buSzPct val="45000"/>
-              <a:buFont typeface="StarSymbol"/>
-              <a:buChar char="●"/>
-            </a:pPr>
-            <a:r>
-              <a:rPr lang="fr-FR" sz="2000"/>
-              <a:t> Gestion et synchronisation des travaux de chaque personne.</a:t>
-            </a:r>
-          </a:p>
-          <a:p>
-            <a:pPr lvl="0">
-              <a:buClr>
-                <a:srgbClr val="000000"/>
-              </a:buClr>
-              <a:buSzPct val="45000"/>
-              <a:buFont typeface="StarSymbol"/>
-              <a:buChar char="●"/>
-            </a:pPr>
-            <a:r>
-              <a:rPr lang="fr-FR" sz="2000"/>
-              <a:t> Suivi des conventions de codage.</a:t>
-            </a:r>
-          </a:p>
-          <a:p>
-            <a:pPr lvl="0">
-              <a:buClr>
-                <a:srgbClr val="000000"/>
-              </a:buClr>
-              <a:buSzPct val="45000"/>
-              <a:buFont typeface="StarSymbol"/>
-              <a:buChar char="●"/>
-            </a:pPr>
-            <a:r>
-              <a:rPr lang="fr-FR" sz="2000"/>
-              <a:t> Application du modèle MVC.</a:t>
-            </a:r>
-          </a:p>
-          <a:p>
-            <a:pPr lvl="0">
-              <a:buClr>
-                <a:srgbClr val="000000"/>
-              </a:buClr>
-              <a:buSzPct val="45000"/>
-              <a:buFont typeface="StarSymbol"/>
-              <a:buChar char="●"/>
-            </a:pPr>
-            <a:r>
-              <a:rPr lang="fr-FR" sz="2000"/>
-              <a:t> Mises à niveaux et formations.</a:t>
-            </a:r>
-          </a:p>
-        </p:txBody>
-      </p:sp>
-      <p:sp>
-        <p:nvSpPr>
-          <p:cNvPr id="4" name="Espace réservé du texte 3"/>
-          <p:cNvSpPr txBox="1">
-            <a:spLocks noGrp="1"/>
-          </p:cNvSpPr>
-          <p:nvPr>
-            <p:ph type="body" idx="4294967295"/>
-          </p:nvPr>
-        </p:nvSpPr>
-        <p:spPr>
-          <a:xfrm>
-            <a:off x="647998" y="4806717"/>
-            <a:ext cx="9067684" cy="1223997"/>
-          </a:xfrm>
-        </p:spPr>
-        <p:txBody>
-          <a:bodyPr/>
-          <a:lstStyle/>
-          <a:p>
-            <a:pPr lvl="0">
-              <a:buClr>
-                <a:srgbClr val="000000"/>
-              </a:buClr>
-              <a:buSzPct val="45000"/>
-              <a:buFont typeface="StarSymbol"/>
-              <a:buChar char="●"/>
-            </a:pPr>
-            <a:r>
-              <a:rPr lang="fr-FR" sz="2000" dirty="0"/>
-              <a:t> Établissement de la communication entre le serveur et le client.</a:t>
-            </a:r>
-          </a:p>
-          <a:p>
-            <a:pPr lvl="0">
-              <a:buClr>
-                <a:srgbClr val="000000"/>
-              </a:buClr>
-              <a:buSzPct val="45000"/>
-              <a:buFont typeface="StarSymbol"/>
-              <a:buChar char="●"/>
-            </a:pPr>
-            <a:r>
-              <a:rPr lang="fr-FR" sz="2000" dirty="0"/>
-              <a:t> Installation de bibliothèques tierces sur Windows (SSL</a:t>
-            </a:r>
-            <a:r>
-              <a:rPr lang="fr-FR" sz="2000" dirty="0" smtClean="0"/>
-              <a:t>).</a:t>
-            </a:r>
-          </a:p>
-          <a:p>
-            <a:pPr lvl="0">
-              <a:buClr>
-                <a:srgbClr val="000000"/>
-              </a:buClr>
-              <a:buSzPct val="45000"/>
-              <a:buFont typeface="StarSymbol"/>
-              <a:buChar char="●"/>
-            </a:pPr>
-            <a:r>
-              <a:rPr lang="fr-FR" sz="2000" dirty="0"/>
-              <a:t> </a:t>
-            </a:r>
-            <a:r>
-              <a:rPr lang="fr-FR" sz="2000" dirty="0" smtClean="0"/>
-              <a:t>Dépendances circulaires.</a:t>
-            </a:r>
-            <a:endParaRPr lang="fr-FR" sz="2000" dirty="0"/>
-          </a:p>
-        </p:txBody>
-      </p:sp>
-      <p:sp>
-        <p:nvSpPr>
-          <p:cNvPr id="5" name="Titre 4"/>
-          <p:cNvSpPr txBox="1">
-            <a:spLocks noGrp="1"/>
-          </p:cNvSpPr>
-          <p:nvPr>
-            <p:ph type="title" idx="4294967295"/>
-          </p:nvPr>
-        </p:nvSpPr>
-        <p:spPr>
-          <a:xfrm>
-            <a:off x="359999" y="1506153"/>
-            <a:ext cx="5327998" cy="564120"/>
-          </a:xfrm>
-        </p:spPr>
-        <p:txBody>
-          <a:bodyPr anchorCtr="0"/>
-          <a:lstStyle/>
-          <a:p>
-            <a:pPr lvl="0" algn="l"/>
-            <a:r>
-              <a:rPr lang="fr-CH" sz="2800"/>
-              <a:t>Problèmes organisationnels</a:t>
-            </a:r>
-          </a:p>
-        </p:txBody>
-      </p:sp>
-      <p:sp>
-        <p:nvSpPr>
-          <p:cNvPr id="6" name="Titre 5"/>
-          <p:cNvSpPr txBox="1">
-            <a:spLocks noGrp="1"/>
-          </p:cNvSpPr>
-          <p:nvPr>
-            <p:ph type="title" idx="4294967295"/>
-          </p:nvPr>
-        </p:nvSpPr>
-        <p:spPr>
-          <a:xfrm>
-            <a:off x="359999" y="4098441"/>
-            <a:ext cx="5327998" cy="564120"/>
-          </a:xfrm>
-        </p:spPr>
-        <p:txBody>
-          <a:bodyPr anchorCtr="0"/>
-          <a:lstStyle/>
-          <a:p>
-            <a:pPr lvl="0" algn="l"/>
-            <a:r>
-              <a:rPr lang="fr-CH" sz="2800"/>
-              <a:t>Problèmes techniques</a:t>
-            </a:r>
-          </a:p>
-        </p:txBody>
-      </p:sp>
-      <p:pic>
-        <p:nvPicPr>
-          <p:cNvPr id="7" name="Image 6"/>
-          <p:cNvPicPr>
-            <a:picLocks noChangeAspect="1"/>
-          </p:cNvPicPr>
-          <p:nvPr/>
-        </p:nvPicPr>
-        <p:blipFill>
-          <a:blip r:embed="rId3">
-            <a:lum/>
-            <a:alphaModFix/>
-          </a:blip>
-          <a:srcRect/>
-          <a:stretch>
-            <a:fillRect/>
-          </a:stretch>
-        </p:blipFill>
-        <p:spPr>
-          <a:xfrm>
-            <a:off x="287999" y="195837"/>
-            <a:ext cx="1151997" cy="1082878"/>
-          </a:xfrm>
-          <a:prstGeom prst="rect">
-            <a:avLst/>
-          </a:prstGeom>
-          <a:noFill/>
-          <a:ln>
-            <a:noFill/>
-          </a:ln>
-        </p:spPr>
-      </p:pic>
-      <p:pic>
-        <p:nvPicPr>
-          <p:cNvPr id="8" name="Picture 6" descr="C:\Users\Miguel\Copy\Cours\2ème_année\PRO\ProjetChat2015\build-Chat-Desktop_Qt_5_4_0_MSVC2012_OpenGL_32bit-Debug\img\dislike.png"/>
-          <p:cNvPicPr>
-            <a:picLocks noChangeAspect="1"/>
-          </p:cNvPicPr>
-          <p:nvPr/>
-        </p:nvPicPr>
-        <p:blipFill>
-          <a:blip r:embed="rId4"/>
-          <a:srcRect/>
-          <a:stretch>
-            <a:fillRect/>
-          </a:stretch>
-        </p:blipFill>
-        <p:spPr>
-          <a:xfrm>
-            <a:off x="8568833" y="202192"/>
-            <a:ext cx="1151997" cy="1148001"/>
-          </a:xfrm>
-          <a:prstGeom prst="rect">
-            <a:avLst/>
-          </a:prstGeom>
-          <a:noFill/>
-          <a:ln>
-            <a:noFill/>
-          </a:ln>
-        </p:spPr>
-      </p:pic>
-      <p:sp>
-        <p:nvSpPr>
-          <p:cNvPr id="9" name="ZoneTexte 11"/>
-          <p:cNvSpPr txBox="1"/>
-          <p:nvPr/>
-        </p:nvSpPr>
-        <p:spPr>
-          <a:xfrm>
-            <a:off x="9723592" y="5877406"/>
-            <a:ext cx="285274" cy="369335"/>
-          </a:xfrm>
-          <a:prstGeom prst="rect">
-            <a:avLst/>
-          </a:prstGeom>
-          <a:noFill/>
-          <a:ln>
-            <a:noFill/>
-          </a:ln>
-        </p:spPr>
-        <p:txBody>
-          <a:bodyPr vert="horz" wrap="square" lIns="91440" tIns="45720" rIns="91440" bIns="45720" anchor="t" anchorCtr="0" compatLnSpc="1">
-            <a:spAutoFit/>
-          </a:bodyPr>
-          <a:lstStyle/>
-          <a:p>
-            <a:pPr marL="0" marR="0" lvl="0" indent="0" algn="l" defTabSz="914400" rtl="0" fontAlgn="auto" hangingPunct="1">
-              <a:lnSpc>
-                <a:spcPct val="100000"/>
-              </a:lnSpc>
-              <a:spcBef>
-                <a:spcPts val="0"/>
-              </a:spcBef>
-              <a:spcAft>
-                <a:spcPts val="0"/>
-              </a:spcAft>
-              <a:buNone/>
-              <a:tabLst/>
-              <a:defRPr sz="1800" b="0" i="0" u="none" strike="noStrike" kern="0" cap="none" spc="0" baseline="0">
-                <a:solidFill>
-                  <a:srgbClr val="000000"/>
-                </a:solidFill>
-                <a:uFillTx/>
-              </a:defRPr>
-            </a:pPr>
-            <a:r>
-              <a:rPr lang="fr-CH" sz="1800" b="0" i="0" u="none" strike="noStrike" kern="1200" cap="none" spc="0" baseline="0">
+              <a:rPr lang="fr-CH" sz="1800" b="0" i="0" u="none" strike="noStrike" kern="1200" cap="none" spc="0" baseline="0" dirty="0" smtClean="0">
                 <a:solidFill>
                   <a:srgbClr val="000000"/>
                 </a:solidFill>
@@ -9353,6 +9673,13 @@
               </a:rPr>
               <a:t>8</a:t>
             </a:r>
+            <a:endParaRPr lang="fr-CH" sz="1800" b="0" i="0" u="none" strike="noStrike" kern="1200" cap="none" spc="0" baseline="0" dirty="0">
+              <a:solidFill>
+                <a:srgbClr val="000000"/>
+              </a:solidFill>
+              <a:uFillTx/>
+              <a:latin typeface="Calibri"/>
+            </a:endParaRPr>
           </a:p>
         </p:txBody>
       </p:sp>
@@ -9361,9 +9688,18 @@
   <p:clrMapOvr>
     <a:masterClrMapping/>
   </p:clrMapOvr>
-  <p:transition spd="med">
-    <p:fade/>
-  </p:transition>
+  <mc:AlternateContent xmlns:mc="http://schemas.openxmlformats.org/markup-compatibility/2006" xmlns:p14="http://schemas.microsoft.com/office/powerpoint/2010/main">
+    <mc:Choice Requires="p14">
+      <p:transition spd="med" p14:dur="700">
+        <p:fade/>
+      </p:transition>
+    </mc:Choice>
+    <mc:Fallback xmlns="">
+      <p:transition spd="med">
+        <p:fade/>
+      </p:transition>
+    </mc:Fallback>
+  </mc:AlternateContent>
   <p:timing>
     <p:tnLst>
       <p:par>

</xml_diff>